<commit_message>
updated by mentioned comments from presentation
</commit_message>
<xml_diff>
--- a/DFB_Presentation.pptx
+++ b/DFB_Presentation.pptx
@@ -5,7 +5,7 @@
     <p:sldMasterId id="2147483648" r:id="rId1"/>
   </p:sldMasterIdLst>
   <p:notesMasterIdLst>
-    <p:notesMasterId r:id="rId7"/>
+    <p:notesMasterId r:id="rId9"/>
   </p:notesMasterIdLst>
   <p:sldIdLst>
     <p:sldId id="256" r:id="rId2"/>
@@ -13,6 +13,8 @@
     <p:sldId id="258" r:id="rId4"/>
     <p:sldId id="259" r:id="rId5"/>
     <p:sldId id="260" r:id="rId6"/>
+    <p:sldId id="261" r:id="rId7"/>
+    <p:sldId id="262" r:id="rId8"/>
   </p:sldIdLst>
   <p:sldSz cx="12192000" cy="6858000"/>
   <p:notesSz cx="6858000" cy="9144000"/>
@@ -111,6 +113,11 @@
       </a:defRPr>
     </a:lvl9pPr>
   </p:defaultTextStyle>
+  <p:extLst>
+    <p:ext uri="{EFAFB233-063F-42B5-8137-9DF3F51BA10A}">
+      <p15:sldGuideLst xmlns:p15="http://schemas.microsoft.com/office/powerpoint/2012/main"/>
+    </p:ext>
+  </p:extLst>
 </p:presentation>
 </file>
 
@@ -196,7 +203,7 @@
           <a:p>
             <a:fld id="{0A2D9033-0BAE-4A73-93FE-55CB68E6B4A0}" type="datetimeFigureOut">
               <a:rPr lang="en-GB" smtClean="0"/>
-              <a:t>16/06/2021</a:t>
+              <a:t>17/06/2021</a:t>
             </a:fld>
             <a:endParaRPr lang="en-GB"/>
           </a:p>
@@ -613,7 +620,7 @@
           <a:p>
             <a:fld id="{53431C26-660F-422A-AC19-8B1AED6BDDE2}" type="datetime1">
               <a:rPr lang="en-GB" smtClean="0"/>
-              <a:t>16/06/2021</a:t>
+              <a:t>17/06/2021</a:t>
             </a:fld>
             <a:endParaRPr lang="en-GB" dirty="0"/>
           </a:p>
@@ -816,7 +823,7 @@
           <a:p>
             <a:fld id="{1FFCBEA9-D9BA-4DC9-B325-E6B20B20B55A}" type="datetime1">
               <a:rPr lang="en-GB" smtClean="0"/>
-              <a:t>16/06/2021</a:t>
+              <a:t>17/06/2021</a:t>
             </a:fld>
             <a:endParaRPr lang="en-GB"/>
           </a:p>
@@ -1029,7 +1036,7 @@
           <a:p>
             <a:fld id="{E7A2FE2D-68B5-4724-8F2D-3462B90C4840}" type="datetime1">
               <a:rPr lang="en-GB" smtClean="0"/>
-              <a:t>16/06/2021</a:t>
+              <a:t>17/06/2021</a:t>
             </a:fld>
             <a:endParaRPr lang="en-GB"/>
           </a:p>
@@ -1232,7 +1239,7 @@
           <a:p>
             <a:fld id="{4AA777ED-11A6-4EEC-A735-F9E3E574811C}" type="datetime1">
               <a:rPr lang="en-GB" smtClean="0"/>
-              <a:t>16/06/2021</a:t>
+              <a:t>17/06/2021</a:t>
             </a:fld>
             <a:endParaRPr lang="en-GB"/>
           </a:p>
@@ -1511,7 +1518,7 @@
           <a:p>
             <a:fld id="{7B9BB12D-B625-4D82-AAC4-ADB845DB52BF}" type="datetime1">
               <a:rPr lang="en-GB" smtClean="0"/>
-              <a:t>16/06/2021</a:t>
+              <a:t>17/06/2021</a:t>
             </a:fld>
             <a:endParaRPr lang="en-GB"/>
           </a:p>
@@ -1782,7 +1789,7 @@
           <a:p>
             <a:fld id="{8F615925-C5B0-48A9-B85B-708D3A7C69C6}" type="datetime1">
               <a:rPr lang="en-GB" smtClean="0"/>
-              <a:t>16/06/2021</a:t>
+              <a:t>17/06/2021</a:t>
             </a:fld>
             <a:endParaRPr lang="en-GB"/>
           </a:p>
@@ -2200,7 +2207,7 @@
           <a:p>
             <a:fld id="{A6946983-77FB-42E7-9998-DDD144E80630}" type="datetime1">
               <a:rPr lang="en-GB" smtClean="0"/>
-              <a:t>16/06/2021</a:t>
+              <a:t>17/06/2021</a:t>
             </a:fld>
             <a:endParaRPr lang="en-GB"/>
           </a:p>
@@ -2345,7 +2352,7 @@
           <a:p>
             <a:fld id="{7C8499E7-7509-4667-9AD8-0C2AFCA5506F}" type="datetime1">
               <a:rPr lang="en-GB" smtClean="0"/>
-              <a:t>16/06/2021</a:t>
+              <a:t>17/06/2021</a:t>
             </a:fld>
             <a:endParaRPr lang="en-GB"/>
           </a:p>
@@ -2461,7 +2468,7 @@
           <a:p>
             <a:fld id="{FC1652DE-D59D-42D3-83C0-06692F6EC81B}" type="datetime1">
               <a:rPr lang="en-GB" smtClean="0"/>
-              <a:t>16/06/2021</a:t>
+              <a:t>17/06/2021</a:t>
             </a:fld>
             <a:endParaRPr lang="en-GB"/>
           </a:p>
@@ -2777,7 +2784,7 @@
           <a:p>
             <a:fld id="{9FE4D19E-C88E-4113-BACE-10C21A0AC54A}" type="datetime1">
               <a:rPr lang="en-GB" smtClean="0"/>
-              <a:t>16/06/2021</a:t>
+              <a:t>17/06/2021</a:t>
             </a:fld>
             <a:endParaRPr lang="en-GB"/>
           </a:p>
@@ -3069,7 +3076,7 @@
           <a:p>
             <a:fld id="{A6A0BFFA-368F-4049-8940-F8694F4F1E06}" type="datetime1">
               <a:rPr lang="en-GB" smtClean="0"/>
-              <a:t>16/06/2021</a:t>
+              <a:t>17/06/2021</a:t>
             </a:fld>
             <a:endParaRPr lang="en-GB"/>
           </a:p>
@@ -3315,7 +3322,7 @@
           <a:p>
             <a:fld id="{732BB107-DAAF-401E-85F9-DAC98A3C4C64}" type="datetime1">
               <a:rPr lang="en-GB" smtClean="0"/>
-              <a:t>16/06/2021</a:t>
+              <a:t>17/06/2021</a:t>
             </a:fld>
             <a:endParaRPr lang="en-GB"/>
           </a:p>
@@ -4003,7 +4010,7 @@
           <a:p>
             <a:fld id="{0E2C7100-F573-408D-818C-4AB9B9D839B5}" type="datetime1">
               <a:rPr lang="en-GB" smtClean="0"/>
-              <a:t>16/06/2021</a:t>
+              <a:t>17/06/2021</a:t>
             </a:fld>
             <a:endParaRPr lang="en-GB"/>
           </a:p>
@@ -4267,7 +4274,7 @@
           <a:p>
             <a:fld id="{8CD39904-5DF9-4CED-AA86-AF3092F3BF98}" type="datetime1">
               <a:rPr lang="en-GB" smtClean="0"/>
-              <a:t>16/06/2021</a:t>
+              <a:t>17/06/2021</a:t>
             </a:fld>
             <a:endParaRPr lang="en-GB"/>
           </a:p>
@@ -4419,7 +4426,7 @@
             <a:pPr lvl="1"/>
             <a:r>
               <a:rPr lang="en-GB" dirty="0"/>
-              <a:t>Organize the Football Association</a:t>
+              <a:t>Organize the Football Associations</a:t>
             </a:r>
           </a:p>
           <a:p>
@@ -4498,7 +4505,7 @@
           <a:p>
             <a:fld id="{080768AF-5FF1-4969-B94B-159B60302A64}" type="datetime1">
               <a:rPr lang="en-GB" smtClean="0"/>
-              <a:t>16/06/2021</a:t>
+              <a:t>17/06/2021</a:t>
             </a:fld>
             <a:endParaRPr lang="en-GB"/>
           </a:p>
@@ -4615,7 +4622,7 @@
           <a:p>
             <a:r>
               <a:rPr lang="en-GB" b="1" dirty="0"/>
-              <a:t>Purpose if the App</a:t>
+              <a:t>Purpose of the Application</a:t>
             </a:r>
           </a:p>
         </p:txBody>
@@ -4755,7 +4762,7 @@
           <a:p>
             <a:fld id="{0EC01BB1-CD65-4127-A485-F39D98ED546A}" type="datetime1">
               <a:rPr lang="en-GB" smtClean="0"/>
-              <a:t>16/06/2021</a:t>
+              <a:t>17/06/2021</a:t>
             </a:fld>
             <a:endParaRPr lang="en-GB"/>
           </a:p>
@@ -4823,6 +4830,452 @@
     <p:extLst>
       <p:ext uri="{BB962C8B-B14F-4D97-AF65-F5344CB8AC3E}">
         <p14:creationId xmlns:p14="http://schemas.microsoft.com/office/powerpoint/2010/main" val="4043555297"/>
+      </p:ext>
+    </p:extLst>
+  </p:cSld>
+  <p:clrMapOvr>
+    <a:masterClrMapping/>
+  </p:clrMapOvr>
+</p:sld>
+</file>
+
+<file path=ppt/slides/slide6.xml><?xml version="1.0" encoding="utf-8"?>
+<p:sld xmlns:a="http://schemas.openxmlformats.org/drawingml/2006/main" xmlns:r="http://schemas.openxmlformats.org/officeDocument/2006/relationships" xmlns:p="http://schemas.openxmlformats.org/presentationml/2006/main">
+  <p:cSld>
+    <p:spTree>
+      <p:nvGrpSpPr>
+        <p:cNvPr id="1" name=""/>
+        <p:cNvGrpSpPr/>
+        <p:nvPr/>
+      </p:nvGrpSpPr>
+      <p:grpSpPr>
+        <a:xfrm>
+          <a:off x="0" y="0"/>
+          <a:ext cx="0" cy="0"/>
+          <a:chOff x="0" y="0"/>
+          <a:chExt cx="0" cy="0"/>
+        </a:xfrm>
+      </p:grpSpPr>
+      <p:sp>
+        <p:nvSpPr>
+          <p:cNvPr id="2" name="Title 1">
+            <a:extLst>
+              <a:ext uri="{FF2B5EF4-FFF2-40B4-BE49-F238E27FC236}">
+                <a16:creationId xmlns:a16="http://schemas.microsoft.com/office/drawing/2014/main" id="{7F46E94E-8BBA-49BC-BAF1-45F76AB8FAF8}"/>
+              </a:ext>
+            </a:extLst>
+          </p:cNvPr>
+          <p:cNvSpPr>
+            <a:spLocks noGrp="1"/>
+          </p:cNvSpPr>
+          <p:nvPr>
+            <p:ph type="title"/>
+          </p:nvPr>
+        </p:nvSpPr>
+        <p:spPr/>
+        <p:txBody>
+          <a:bodyPr/>
+          <a:lstStyle/>
+          <a:p>
+            <a:r>
+              <a:rPr lang="en-GB" b="1" dirty="0"/>
+              <a:t>Different Use Cases</a:t>
+            </a:r>
+          </a:p>
+        </p:txBody>
+      </p:sp>
+      <p:sp>
+        <p:nvSpPr>
+          <p:cNvPr id="3" name="Content Placeholder 2">
+            <a:extLst>
+              <a:ext uri="{FF2B5EF4-FFF2-40B4-BE49-F238E27FC236}">
+                <a16:creationId xmlns:a16="http://schemas.microsoft.com/office/drawing/2014/main" id="{1F0BDC49-6B78-4C47-A4D8-4FE8457E2436}"/>
+              </a:ext>
+            </a:extLst>
+          </p:cNvPr>
+          <p:cNvSpPr>
+            <a:spLocks noGrp="1"/>
+          </p:cNvSpPr>
+          <p:nvPr>
+            <p:ph idx="1"/>
+          </p:nvPr>
+        </p:nvSpPr>
+        <p:spPr/>
+        <p:txBody>
+          <a:bodyPr/>
+          <a:lstStyle/>
+          <a:p>
+            <a:r>
+              <a:rPr lang="en-GB" dirty="0"/>
+              <a:t>create a new Account (with login/-out)</a:t>
+            </a:r>
+          </a:p>
+          <a:p>
+            <a:r>
+              <a:rPr lang="en-GB" dirty="0"/>
+              <a:t>Account represents type of Person (Member, Coach, Player, President)</a:t>
+            </a:r>
+          </a:p>
+          <a:p>
+            <a:r>
+              <a:rPr lang="en-GB" dirty="0"/>
+              <a:t>depending on type a user has following managing tasks:</a:t>
+            </a:r>
+          </a:p>
+          <a:p>
+            <a:r>
+              <a:rPr lang="en-GB" dirty="0"/>
+              <a:t>all users:</a:t>
+            </a:r>
+          </a:p>
+          <a:p>
+            <a:pPr lvl="1"/>
+            <a:r>
+              <a:rPr lang="en-GB" dirty="0"/>
+              <a:t>view lists of football associations, clubs, teams, etc.</a:t>
+            </a:r>
+          </a:p>
+          <a:p>
+            <a:r>
+              <a:rPr lang="en-GB" dirty="0"/>
+              <a:t>Members &amp; Player:</a:t>
+            </a:r>
+          </a:p>
+          <a:p>
+            <a:pPr lvl="1"/>
+            <a:r>
+              <a:rPr lang="en-GB" dirty="0"/>
+              <a:t>join/leave a football association or football club as member</a:t>
+            </a:r>
+          </a:p>
+        </p:txBody>
+      </p:sp>
+      <p:sp>
+        <p:nvSpPr>
+          <p:cNvPr id="4" name="Date Placeholder 3">
+            <a:extLst>
+              <a:ext uri="{FF2B5EF4-FFF2-40B4-BE49-F238E27FC236}">
+                <a16:creationId xmlns:a16="http://schemas.microsoft.com/office/drawing/2014/main" id="{FCCA77FC-D148-417B-B7E8-D42A08AF83C3}"/>
+              </a:ext>
+            </a:extLst>
+          </p:cNvPr>
+          <p:cNvSpPr>
+            <a:spLocks noGrp="1"/>
+          </p:cNvSpPr>
+          <p:nvPr>
+            <p:ph type="dt" sz="half" idx="10"/>
+          </p:nvPr>
+        </p:nvSpPr>
+        <p:spPr/>
+        <p:txBody>
+          <a:bodyPr/>
+          <a:lstStyle/>
+          <a:p>
+            <a:fld id="{4AA777ED-11A6-4EEC-A735-F9E3E574811C}" type="datetime1">
+              <a:rPr lang="en-GB" smtClean="0"/>
+              <a:t>17/06/2021</a:t>
+            </a:fld>
+            <a:endParaRPr lang="en-GB" dirty="0"/>
+          </a:p>
+        </p:txBody>
+      </p:sp>
+      <p:sp>
+        <p:nvSpPr>
+          <p:cNvPr id="5" name="Footer Placeholder 4">
+            <a:extLst>
+              <a:ext uri="{FF2B5EF4-FFF2-40B4-BE49-F238E27FC236}">
+                <a16:creationId xmlns:a16="http://schemas.microsoft.com/office/drawing/2014/main" id="{6BDBE662-71A0-4DA5-8324-D44D799A60D5}"/>
+              </a:ext>
+            </a:extLst>
+          </p:cNvPr>
+          <p:cNvSpPr>
+            <a:spLocks noGrp="1"/>
+          </p:cNvSpPr>
+          <p:nvPr>
+            <p:ph type="ftr" sz="quarter" idx="11"/>
+          </p:nvPr>
+        </p:nvSpPr>
+        <p:spPr/>
+        <p:txBody>
+          <a:bodyPr/>
+          <a:lstStyle/>
+          <a:p>
+            <a:r>
+              <a:rPr lang="en-GB"/>
+              <a:t>Max Bergmann &amp; Christian Prinz</a:t>
+            </a:r>
+            <a:endParaRPr lang="en-GB" dirty="0"/>
+          </a:p>
+        </p:txBody>
+      </p:sp>
+      <p:sp>
+        <p:nvSpPr>
+          <p:cNvPr id="6" name="Slide Number Placeholder 5">
+            <a:extLst>
+              <a:ext uri="{FF2B5EF4-FFF2-40B4-BE49-F238E27FC236}">
+                <a16:creationId xmlns:a16="http://schemas.microsoft.com/office/drawing/2014/main" id="{7F474DC3-D70B-40A9-ABFA-E5F86739D788}"/>
+              </a:ext>
+            </a:extLst>
+          </p:cNvPr>
+          <p:cNvSpPr>
+            <a:spLocks noGrp="1"/>
+          </p:cNvSpPr>
+          <p:nvPr>
+            <p:ph type="sldNum" sz="quarter" idx="12"/>
+          </p:nvPr>
+        </p:nvSpPr>
+        <p:spPr/>
+        <p:txBody>
+          <a:bodyPr/>
+          <a:lstStyle/>
+          <a:p>
+            <a:fld id="{8038357F-2623-4539-AE92-5E8B4172180E}" type="slidenum">
+              <a:rPr lang="en-GB" smtClean="0"/>
+              <a:t>6</a:t>
+            </a:fld>
+            <a:endParaRPr lang="en-GB" dirty="0"/>
+          </a:p>
+        </p:txBody>
+      </p:sp>
+    </p:spTree>
+    <p:extLst>
+      <p:ext uri="{BB962C8B-B14F-4D97-AF65-F5344CB8AC3E}">
+        <p14:creationId xmlns:p14="http://schemas.microsoft.com/office/powerpoint/2010/main" val="1791354069"/>
+      </p:ext>
+    </p:extLst>
+  </p:cSld>
+  <p:clrMapOvr>
+    <a:masterClrMapping/>
+  </p:clrMapOvr>
+</p:sld>
+</file>
+
+<file path=ppt/slides/slide7.xml><?xml version="1.0" encoding="utf-8"?>
+<p:sld xmlns:a="http://schemas.openxmlformats.org/drawingml/2006/main" xmlns:r="http://schemas.openxmlformats.org/officeDocument/2006/relationships" xmlns:p="http://schemas.openxmlformats.org/presentationml/2006/main">
+  <p:cSld>
+    <p:spTree>
+      <p:nvGrpSpPr>
+        <p:cNvPr id="1" name=""/>
+        <p:cNvGrpSpPr/>
+        <p:nvPr/>
+      </p:nvGrpSpPr>
+      <p:grpSpPr>
+        <a:xfrm>
+          <a:off x="0" y="0"/>
+          <a:ext cx="0" cy="0"/>
+          <a:chOff x="0" y="0"/>
+          <a:chExt cx="0" cy="0"/>
+        </a:xfrm>
+      </p:grpSpPr>
+      <p:sp>
+        <p:nvSpPr>
+          <p:cNvPr id="2" name="Title 1">
+            <a:extLst>
+              <a:ext uri="{FF2B5EF4-FFF2-40B4-BE49-F238E27FC236}">
+                <a16:creationId xmlns:a16="http://schemas.microsoft.com/office/drawing/2014/main" id="{9B919890-8341-4CC5-8523-1AB9A3A16052}"/>
+              </a:ext>
+            </a:extLst>
+          </p:cNvPr>
+          <p:cNvSpPr>
+            <a:spLocks noGrp="1"/>
+          </p:cNvSpPr>
+          <p:nvPr>
+            <p:ph type="title"/>
+          </p:nvPr>
+        </p:nvSpPr>
+        <p:spPr/>
+        <p:txBody>
+          <a:bodyPr/>
+          <a:lstStyle/>
+          <a:p>
+            <a:r>
+              <a:rPr lang="en-GB" b="1" dirty="0"/>
+              <a:t>Different Use Cases</a:t>
+            </a:r>
+          </a:p>
+        </p:txBody>
+      </p:sp>
+      <p:sp>
+        <p:nvSpPr>
+          <p:cNvPr id="3" name="Content Placeholder 2">
+            <a:extLst>
+              <a:ext uri="{FF2B5EF4-FFF2-40B4-BE49-F238E27FC236}">
+                <a16:creationId xmlns:a16="http://schemas.microsoft.com/office/drawing/2014/main" id="{D0A1001F-C0A2-46D9-B62D-93F31619CA53}"/>
+              </a:ext>
+            </a:extLst>
+          </p:cNvPr>
+          <p:cNvSpPr>
+            <a:spLocks noGrp="1"/>
+          </p:cNvSpPr>
+          <p:nvPr>
+            <p:ph idx="1"/>
+          </p:nvPr>
+        </p:nvSpPr>
+        <p:spPr/>
+        <p:txBody>
+          <a:bodyPr/>
+          <a:lstStyle/>
+          <a:p>
+            <a:r>
+              <a:rPr lang="en-GB" dirty="0"/>
+              <a:t>Coaches</a:t>
+            </a:r>
+          </a:p>
+          <a:p>
+            <a:pPr lvl="1"/>
+            <a:r>
+              <a:rPr lang="en-GB" dirty="0"/>
+              <a:t>leave a football club/national team</a:t>
+            </a:r>
+          </a:p>
+          <a:p>
+            <a:pPr lvl="1"/>
+            <a:r>
+              <a:rPr lang="en-GB" dirty="0"/>
+              <a:t>can change to national team (implies leaving football club)</a:t>
+            </a:r>
+          </a:p>
+          <a:p>
+            <a:pPr lvl="2"/>
+            <a:r>
+              <a:rPr lang="en-GB" dirty="0"/>
+              <a:t>initialized by president of football association </a:t>
+            </a:r>
+          </a:p>
+          <a:p>
+            <a:pPr lvl="1"/>
+            <a:r>
+              <a:rPr lang="en-GB" dirty="0"/>
+              <a:t>can add/remove players to/from his team (transferring players)</a:t>
+            </a:r>
+          </a:p>
+          <a:p>
+            <a:r>
+              <a:rPr lang="en-GB" dirty="0"/>
+              <a:t>President</a:t>
+            </a:r>
+          </a:p>
+          <a:p>
+            <a:pPr lvl="1"/>
+            <a:r>
+              <a:rPr lang="en-GB" dirty="0"/>
+              <a:t>join/leave football association</a:t>
+            </a:r>
+          </a:p>
+          <a:p>
+            <a:pPr lvl="1"/>
+            <a:r>
+              <a:rPr lang="en-GB" dirty="0"/>
+              <a:t>add/remove football clubs to/from football association</a:t>
+            </a:r>
+          </a:p>
+          <a:p>
+            <a:pPr lvl="1"/>
+            <a:r>
+              <a:rPr lang="en-GB" dirty="0"/>
+              <a:t>move his football association/club to another superior football association</a:t>
+            </a:r>
+          </a:p>
+          <a:p>
+            <a:pPr lvl="1"/>
+            <a:r>
+              <a:rPr lang="en-GB" dirty="0"/>
+              <a:t>order subordinated football associations and football clubs</a:t>
+            </a:r>
+          </a:p>
+        </p:txBody>
+      </p:sp>
+      <p:sp>
+        <p:nvSpPr>
+          <p:cNvPr id="4" name="Date Placeholder 3">
+            <a:extLst>
+              <a:ext uri="{FF2B5EF4-FFF2-40B4-BE49-F238E27FC236}">
+                <a16:creationId xmlns:a16="http://schemas.microsoft.com/office/drawing/2014/main" id="{3445E8F5-1441-4CCE-8F39-5812B2C4EFED}"/>
+              </a:ext>
+            </a:extLst>
+          </p:cNvPr>
+          <p:cNvSpPr>
+            <a:spLocks noGrp="1"/>
+          </p:cNvSpPr>
+          <p:nvPr>
+            <p:ph type="dt" sz="half" idx="10"/>
+          </p:nvPr>
+        </p:nvSpPr>
+        <p:spPr/>
+        <p:txBody>
+          <a:bodyPr/>
+          <a:lstStyle/>
+          <a:p>
+            <a:fld id="{4AA777ED-11A6-4EEC-A735-F9E3E574811C}" type="datetime1">
+              <a:rPr lang="en-GB" smtClean="0"/>
+              <a:t>17/06/2021</a:t>
+            </a:fld>
+            <a:endParaRPr lang="en-GB"/>
+          </a:p>
+        </p:txBody>
+      </p:sp>
+      <p:sp>
+        <p:nvSpPr>
+          <p:cNvPr id="5" name="Footer Placeholder 4">
+            <a:extLst>
+              <a:ext uri="{FF2B5EF4-FFF2-40B4-BE49-F238E27FC236}">
+                <a16:creationId xmlns:a16="http://schemas.microsoft.com/office/drawing/2014/main" id="{FEF4706A-6BCE-45DE-9E92-AEA768133A2B}"/>
+              </a:ext>
+            </a:extLst>
+          </p:cNvPr>
+          <p:cNvSpPr>
+            <a:spLocks noGrp="1"/>
+          </p:cNvSpPr>
+          <p:nvPr>
+            <p:ph type="ftr" sz="quarter" idx="11"/>
+          </p:nvPr>
+        </p:nvSpPr>
+        <p:spPr/>
+        <p:txBody>
+          <a:bodyPr/>
+          <a:lstStyle/>
+          <a:p>
+            <a:r>
+              <a:rPr lang="en-GB"/>
+              <a:t>Max Bergmann &amp; Christian Prinz</a:t>
+            </a:r>
+            <a:endParaRPr lang="en-GB" dirty="0"/>
+          </a:p>
+        </p:txBody>
+      </p:sp>
+      <p:sp>
+        <p:nvSpPr>
+          <p:cNvPr id="6" name="Slide Number Placeholder 5">
+            <a:extLst>
+              <a:ext uri="{FF2B5EF4-FFF2-40B4-BE49-F238E27FC236}">
+                <a16:creationId xmlns:a16="http://schemas.microsoft.com/office/drawing/2014/main" id="{5AB24CF2-B45E-4B41-8424-B567FAA965C5}"/>
+              </a:ext>
+            </a:extLst>
+          </p:cNvPr>
+          <p:cNvSpPr>
+            <a:spLocks noGrp="1"/>
+          </p:cNvSpPr>
+          <p:nvPr>
+            <p:ph type="sldNum" sz="quarter" idx="12"/>
+          </p:nvPr>
+        </p:nvSpPr>
+        <p:spPr/>
+        <p:txBody>
+          <a:bodyPr/>
+          <a:lstStyle/>
+          <a:p>
+            <a:fld id="{8038357F-2623-4539-AE92-5E8B4172180E}" type="slidenum">
+              <a:rPr lang="en-GB" smtClean="0"/>
+              <a:t>7</a:t>
+            </a:fld>
+            <a:endParaRPr lang="en-GB" dirty="0"/>
+          </a:p>
+        </p:txBody>
+      </p:sp>
+    </p:spTree>
+    <p:extLst>
+      <p:ext uri="{BB962C8B-B14F-4D97-AF65-F5344CB8AC3E}">
+        <p14:creationId xmlns:p14="http://schemas.microsoft.com/office/powerpoint/2010/main" val="2731143960"/>
       </p:ext>
     </p:extLst>
   </p:cSld>

</xml_diff>